<commit_message>
Update Primera hora clase #6
</commit_message>
<xml_diff>
--- a/13) .Net MAUI/Primer App MAUI Blazor Híbrida (2024).pptx
+++ b/13) .Net MAUI/Primer App MAUI Blazor Híbrida (2024).pptx
@@ -1002,7 +1002,7 @@
           </a:ln>
           <a:extLst>
             <a:ext uri="{C572A759-6A51-4108-AA02-DFA0A04FC94B}">
-              <ma14:wrappingTextBoxFlag xmlns:ma14="http://schemas.microsoft.com/office/mac/drawingml/2011/main" xmlns="" val="1"/>
+              <ma14:wrappingTextBoxFlag xmlns="" xmlns:ma14="http://schemas.microsoft.com/office/mac/drawingml/2011/main" val="1"/>
             </a:ext>
           </a:extLst>
         </p:spPr>
@@ -1041,7 +1041,7 @@
           </a:ln>
           <a:extLst>
             <a:ext uri="{C572A759-6A51-4108-AA02-DFA0A04FC94B}">
-              <ma14:wrappingTextBoxFlag xmlns:ma14="http://schemas.microsoft.com/office/mac/drawingml/2011/main" xmlns="" val="1"/>
+              <ma14:wrappingTextBoxFlag xmlns="" xmlns:ma14="http://schemas.microsoft.com/office/mac/drawingml/2011/main" val="1"/>
             </a:ext>
           </a:extLst>
         </p:spPr>
@@ -3250,7 +3250,7 @@
           </a:ln>
           <a:extLst>
             <a:ext uri="{C572A759-6A51-4108-AA02-DFA0A04FC94B}">
-              <ma14:wrappingTextBoxFlag xmlns:ma14="http://schemas.microsoft.com/office/mac/drawingml/2011/main" xmlns="" val="1"/>
+              <ma14:wrappingTextBoxFlag xmlns="" xmlns:ma14="http://schemas.microsoft.com/office/mac/drawingml/2011/main" val="1"/>
             </a:ext>
           </a:extLst>
         </p:spPr>
@@ -3625,7 +3625,7 @@
           </a:ln>
           <a:extLst>
             <a:ext uri="{C572A759-6A51-4108-AA02-DFA0A04FC94B}">
-              <ma14:wrappingTextBoxFlag xmlns:ma14="http://schemas.microsoft.com/office/mac/drawingml/2011/main" xmlns="" val="1"/>
+              <ma14:wrappingTextBoxFlag xmlns="" xmlns:ma14="http://schemas.microsoft.com/office/mac/drawingml/2011/main" val="1"/>
             </a:ext>
           </a:extLst>
         </p:spPr>

</xml_diff>